<commit_message>
Added Coding 3 Exercise. Tidied up folder structure.
</commit_message>
<xml_diff>
--- a/other_resources/Docassemble Syntax Guide.pptx
+++ b/other_resources/Docassemble Syntax Guide.pptx
@@ -7,6 +7,7 @@
   <p:sldIdLst>
     <p:sldId id="256" r:id="rId2"/>
     <p:sldId id="257" r:id="rId3"/>
+    <p:sldId id="258" r:id="rId4"/>
   </p:sldIdLst>
   <p:sldSz cx="12192000" cy="6858000"/>
   <p:notesSz cx="6858000" cy="9144000"/>
@@ -4841,10 +4842,1280 @@
           </a:fontRef>
         </p:style>
       </p:cxnSp>
+      <p:sp>
+        <p:nvSpPr>
+          <p:cNvPr id="20" name="TextBox 19">
+            <a:extLst>
+              <a:ext uri="{FF2B5EF4-FFF2-40B4-BE49-F238E27FC236}">
+                <a16:creationId xmlns:a16="http://schemas.microsoft.com/office/drawing/2014/main" id="{FCDD5B3D-C243-B878-5254-35FF142B3FEB}"/>
+              </a:ext>
+            </a:extLst>
+          </p:cNvPr>
+          <p:cNvSpPr txBox="1"/>
+          <p:nvPr/>
+        </p:nvSpPr>
+        <p:spPr>
+          <a:xfrm>
+            <a:off x="7544314" y="2443688"/>
+            <a:ext cx="1581912" cy="707886"/>
+          </a:xfrm>
+          <a:prstGeom prst="rect">
+            <a:avLst/>
+          </a:prstGeom>
+          <a:noFill/>
+          <a:ln w="19050">
+            <a:solidFill>
+              <a:schemeClr val="accent1"/>
+            </a:solidFill>
+          </a:ln>
+        </p:spPr>
+        <p:txBody>
+          <a:bodyPr wrap="square" rtlCol="0">
+            <a:spAutoFit/>
+          </a:bodyPr>
+          <a:lstStyle/>
+          <a:p>
+            <a:r>
+              <a:rPr lang="en-AU" sz="1000" dirty="0"/>
+              <a:t>This is the ‘true branch’. It must be indented at least two spaces right of the ‘if’</a:t>
+            </a:r>
+          </a:p>
+        </p:txBody>
+      </p:sp>
+      <p:cxnSp>
+        <p:nvCxnSpPr>
+          <p:cNvPr id="22" name="Straight Arrow Connector 21">
+            <a:extLst>
+              <a:ext uri="{FF2B5EF4-FFF2-40B4-BE49-F238E27FC236}">
+                <a16:creationId xmlns:a16="http://schemas.microsoft.com/office/drawing/2014/main" id="{AC6DCECD-F0E0-7F88-10F6-0331EE6278F0}"/>
+              </a:ext>
+            </a:extLst>
+          </p:cNvPr>
+          <p:cNvCxnSpPr>
+            <a:stCxn id="20" idx="1"/>
+          </p:cNvCxnSpPr>
+          <p:nvPr/>
+        </p:nvCxnSpPr>
+        <p:spPr>
+          <a:xfrm flipH="1" flipV="1">
+            <a:off x="4791456" y="2602275"/>
+            <a:ext cx="2752858" cy="195356"/>
+          </a:xfrm>
+          <a:prstGeom prst="straightConnector1">
+            <a:avLst/>
+          </a:prstGeom>
+          <a:ln>
+            <a:tailEnd type="triangle"/>
+          </a:ln>
+        </p:spPr>
+        <p:style>
+          <a:lnRef idx="2">
+            <a:schemeClr val="accent1"/>
+          </a:lnRef>
+          <a:fillRef idx="0">
+            <a:schemeClr val="accent1"/>
+          </a:fillRef>
+          <a:effectRef idx="1">
+            <a:schemeClr val="accent1"/>
+          </a:effectRef>
+          <a:fontRef idx="minor">
+            <a:schemeClr val="tx1"/>
+          </a:fontRef>
+        </p:style>
+      </p:cxnSp>
+      <p:sp>
+        <p:nvSpPr>
+          <p:cNvPr id="23" name="TextBox 22">
+            <a:extLst>
+              <a:ext uri="{FF2B5EF4-FFF2-40B4-BE49-F238E27FC236}">
+                <a16:creationId xmlns:a16="http://schemas.microsoft.com/office/drawing/2014/main" id="{7218D489-C0D8-DB05-BD18-7CCC107A1133}"/>
+              </a:ext>
+            </a:extLst>
+          </p:cNvPr>
+          <p:cNvSpPr txBox="1"/>
+          <p:nvPr/>
+        </p:nvSpPr>
+        <p:spPr>
+          <a:xfrm>
+            <a:off x="6623056" y="3948434"/>
+            <a:ext cx="1581912" cy="246221"/>
+          </a:xfrm>
+          <a:prstGeom prst="rect">
+            <a:avLst/>
+          </a:prstGeom>
+          <a:noFill/>
+          <a:ln w="19050">
+            <a:solidFill>
+              <a:schemeClr val="accent1"/>
+            </a:solidFill>
+          </a:ln>
+        </p:spPr>
+        <p:txBody>
+          <a:bodyPr wrap="square" rtlCol="0">
+            <a:spAutoFit/>
+          </a:bodyPr>
+          <a:lstStyle/>
+          <a:p>
+            <a:r>
+              <a:rPr lang="en-AU" sz="1000" dirty="0"/>
+              <a:t>True branch</a:t>
+            </a:r>
+          </a:p>
+        </p:txBody>
+      </p:sp>
+      <p:sp>
+        <p:nvSpPr>
+          <p:cNvPr id="24" name="TextBox 23">
+            <a:extLst>
+              <a:ext uri="{FF2B5EF4-FFF2-40B4-BE49-F238E27FC236}">
+                <a16:creationId xmlns:a16="http://schemas.microsoft.com/office/drawing/2014/main" id="{97BBBFBD-D7C7-F705-6F4D-3D21D7224737}"/>
+              </a:ext>
+            </a:extLst>
+          </p:cNvPr>
+          <p:cNvSpPr txBox="1"/>
+          <p:nvPr/>
+        </p:nvSpPr>
+        <p:spPr>
+          <a:xfrm>
+            <a:off x="5619502" y="5015151"/>
+            <a:ext cx="1581912" cy="246221"/>
+          </a:xfrm>
+          <a:prstGeom prst="rect">
+            <a:avLst/>
+          </a:prstGeom>
+          <a:noFill/>
+          <a:ln w="19050">
+            <a:solidFill>
+              <a:schemeClr val="accent1"/>
+            </a:solidFill>
+          </a:ln>
+        </p:spPr>
+        <p:txBody>
+          <a:bodyPr wrap="square" rtlCol="0">
+            <a:spAutoFit/>
+          </a:bodyPr>
+          <a:lstStyle/>
+          <a:p>
+            <a:r>
+              <a:rPr lang="en-AU" sz="1000" dirty="0"/>
+              <a:t>False branch</a:t>
+            </a:r>
+          </a:p>
+        </p:txBody>
+      </p:sp>
+      <p:cxnSp>
+        <p:nvCxnSpPr>
+          <p:cNvPr id="26" name="Straight Arrow Connector 25">
+            <a:extLst>
+              <a:ext uri="{FF2B5EF4-FFF2-40B4-BE49-F238E27FC236}">
+                <a16:creationId xmlns:a16="http://schemas.microsoft.com/office/drawing/2014/main" id="{0295A818-EEDC-D841-6AE2-DD84973999AD}"/>
+              </a:ext>
+            </a:extLst>
+          </p:cNvPr>
+          <p:cNvCxnSpPr>
+            <a:cxnSpLocks/>
+            <a:stCxn id="23" idx="1"/>
+          </p:cNvCxnSpPr>
+          <p:nvPr/>
+        </p:nvCxnSpPr>
+        <p:spPr>
+          <a:xfrm flipH="1" flipV="1">
+            <a:off x="4791456" y="4024414"/>
+            <a:ext cx="1831600" cy="47131"/>
+          </a:xfrm>
+          <a:prstGeom prst="straightConnector1">
+            <a:avLst/>
+          </a:prstGeom>
+          <a:ln>
+            <a:tailEnd type="triangle"/>
+          </a:ln>
+        </p:spPr>
+        <p:style>
+          <a:lnRef idx="2">
+            <a:schemeClr val="accent1"/>
+          </a:lnRef>
+          <a:fillRef idx="0">
+            <a:schemeClr val="accent1"/>
+          </a:fillRef>
+          <a:effectRef idx="1">
+            <a:schemeClr val="accent1"/>
+          </a:effectRef>
+          <a:fontRef idx="minor">
+            <a:schemeClr val="tx1"/>
+          </a:fontRef>
+        </p:style>
+      </p:cxnSp>
+      <p:cxnSp>
+        <p:nvCxnSpPr>
+          <p:cNvPr id="28" name="Straight Arrow Connector 27">
+            <a:extLst>
+              <a:ext uri="{FF2B5EF4-FFF2-40B4-BE49-F238E27FC236}">
+                <a16:creationId xmlns:a16="http://schemas.microsoft.com/office/drawing/2014/main" id="{B19D0057-4697-D3D8-98FC-365FE0A3D695}"/>
+              </a:ext>
+            </a:extLst>
+          </p:cNvPr>
+          <p:cNvCxnSpPr>
+            <a:cxnSpLocks/>
+            <a:stCxn id="24" idx="1"/>
+          </p:cNvCxnSpPr>
+          <p:nvPr/>
+        </p:nvCxnSpPr>
+        <p:spPr>
+          <a:xfrm flipH="1" flipV="1">
+            <a:off x="4709160" y="4645153"/>
+            <a:ext cx="910342" cy="493109"/>
+          </a:xfrm>
+          <a:prstGeom prst="straightConnector1">
+            <a:avLst/>
+          </a:prstGeom>
+          <a:ln>
+            <a:tailEnd type="triangle"/>
+          </a:ln>
+        </p:spPr>
+        <p:style>
+          <a:lnRef idx="2">
+            <a:schemeClr val="accent1"/>
+          </a:lnRef>
+          <a:fillRef idx="0">
+            <a:schemeClr val="accent1"/>
+          </a:fillRef>
+          <a:effectRef idx="1">
+            <a:schemeClr val="accent1"/>
+          </a:effectRef>
+          <a:fontRef idx="minor">
+            <a:schemeClr val="tx1"/>
+          </a:fontRef>
+        </p:style>
+      </p:cxnSp>
+      <p:sp>
+        <p:nvSpPr>
+          <p:cNvPr id="29" name="TextBox 28">
+            <a:extLst>
+              <a:ext uri="{FF2B5EF4-FFF2-40B4-BE49-F238E27FC236}">
+                <a16:creationId xmlns:a16="http://schemas.microsoft.com/office/drawing/2014/main" id="{E13D6570-5F9E-85B1-F248-494F1DE4F60D}"/>
+              </a:ext>
+            </a:extLst>
+          </p:cNvPr>
+          <p:cNvSpPr txBox="1"/>
+          <p:nvPr/>
+        </p:nvSpPr>
+        <p:spPr>
+          <a:xfrm>
+            <a:off x="653930" y="4768929"/>
+            <a:ext cx="1581912" cy="707886"/>
+          </a:xfrm>
+          <a:prstGeom prst="rect">
+            <a:avLst/>
+          </a:prstGeom>
+          <a:noFill/>
+          <a:ln w="19050">
+            <a:solidFill>
+              <a:schemeClr val="accent1"/>
+            </a:solidFill>
+          </a:ln>
+        </p:spPr>
+        <p:txBody>
+          <a:bodyPr wrap="square" rtlCol="0">
+            <a:spAutoFit/>
+          </a:bodyPr>
+          <a:lstStyle/>
+          <a:p>
+            <a:r>
+              <a:rPr lang="en-AU" sz="1000" dirty="0"/>
+              <a:t>True/false branches must be indented </a:t>
+            </a:r>
+            <a:r>
+              <a:rPr lang="en-AU" sz="1000" b="1" dirty="0"/>
+              <a:t>exactly</a:t>
+            </a:r>
+            <a:r>
+              <a:rPr lang="en-AU" sz="1000" dirty="0"/>
+              <a:t> 2 spaces in from ‘if’ or ‘else’</a:t>
+            </a:r>
+          </a:p>
+        </p:txBody>
+      </p:sp>
+      <p:cxnSp>
+        <p:nvCxnSpPr>
+          <p:cNvPr id="31" name="Straight Arrow Connector 30">
+            <a:extLst>
+              <a:ext uri="{FF2B5EF4-FFF2-40B4-BE49-F238E27FC236}">
+                <a16:creationId xmlns:a16="http://schemas.microsoft.com/office/drawing/2014/main" id="{B9408979-52EB-00D4-0FCF-B68C30288F6A}"/>
+              </a:ext>
+            </a:extLst>
+          </p:cNvPr>
+          <p:cNvCxnSpPr>
+            <a:stCxn id="29" idx="3"/>
+          </p:cNvCxnSpPr>
+          <p:nvPr/>
+        </p:nvCxnSpPr>
+        <p:spPr>
+          <a:xfrm flipV="1">
+            <a:off x="2235842" y="4013115"/>
+            <a:ext cx="1055998" cy="1109757"/>
+          </a:xfrm>
+          <a:prstGeom prst="straightConnector1">
+            <a:avLst/>
+          </a:prstGeom>
+          <a:ln>
+            <a:tailEnd type="triangle"/>
+          </a:ln>
+        </p:spPr>
+        <p:style>
+          <a:lnRef idx="2">
+            <a:schemeClr val="accent1"/>
+          </a:lnRef>
+          <a:fillRef idx="0">
+            <a:schemeClr val="accent1"/>
+          </a:fillRef>
+          <a:effectRef idx="1">
+            <a:schemeClr val="accent1"/>
+          </a:effectRef>
+          <a:fontRef idx="minor">
+            <a:schemeClr val="tx1"/>
+          </a:fontRef>
+        </p:style>
+      </p:cxnSp>
+      <p:cxnSp>
+        <p:nvCxnSpPr>
+          <p:cNvPr id="33" name="Straight Arrow Connector 32">
+            <a:extLst>
+              <a:ext uri="{FF2B5EF4-FFF2-40B4-BE49-F238E27FC236}">
+                <a16:creationId xmlns:a16="http://schemas.microsoft.com/office/drawing/2014/main" id="{9321A65C-DC1E-A1A3-8A2E-41C5FBBCEF99}"/>
+              </a:ext>
+            </a:extLst>
+          </p:cNvPr>
+          <p:cNvCxnSpPr>
+            <a:stCxn id="29" idx="3"/>
+          </p:cNvCxnSpPr>
+          <p:nvPr/>
+        </p:nvCxnSpPr>
+        <p:spPr>
+          <a:xfrm flipV="1">
+            <a:off x="2235842" y="4522042"/>
+            <a:ext cx="1046854" cy="600830"/>
+          </a:xfrm>
+          <a:prstGeom prst="straightConnector1">
+            <a:avLst/>
+          </a:prstGeom>
+          <a:ln>
+            <a:tailEnd type="triangle"/>
+          </a:ln>
+        </p:spPr>
+        <p:style>
+          <a:lnRef idx="2">
+            <a:schemeClr val="accent1"/>
+          </a:lnRef>
+          <a:fillRef idx="0">
+            <a:schemeClr val="accent1"/>
+          </a:fillRef>
+          <a:effectRef idx="1">
+            <a:schemeClr val="accent1"/>
+          </a:effectRef>
+          <a:fontRef idx="minor">
+            <a:schemeClr val="tx1"/>
+          </a:fontRef>
+        </p:style>
+      </p:cxnSp>
+      <p:sp>
+        <p:nvSpPr>
+          <p:cNvPr id="34" name="TextBox 33">
+            <a:extLst>
+              <a:ext uri="{FF2B5EF4-FFF2-40B4-BE49-F238E27FC236}">
+                <a16:creationId xmlns:a16="http://schemas.microsoft.com/office/drawing/2014/main" id="{0B3B28B7-6A43-540A-6E05-7C5A50324E4F}"/>
+              </a:ext>
+            </a:extLst>
+          </p:cNvPr>
+          <p:cNvSpPr txBox="1"/>
+          <p:nvPr/>
+        </p:nvSpPr>
+        <p:spPr>
+          <a:xfrm>
+            <a:off x="6096000" y="4307722"/>
+            <a:ext cx="1581912" cy="400110"/>
+          </a:xfrm>
+          <a:prstGeom prst="rect">
+            <a:avLst/>
+          </a:prstGeom>
+          <a:noFill/>
+          <a:ln w="19050">
+            <a:solidFill>
+              <a:schemeClr val="accent1"/>
+            </a:solidFill>
+          </a:ln>
+        </p:spPr>
+        <p:txBody>
+          <a:bodyPr wrap="square" rtlCol="0">
+            <a:spAutoFit/>
+          </a:bodyPr>
+          <a:lstStyle/>
+          <a:p>
+            <a:r>
+              <a:rPr lang="en-AU" sz="1000" dirty="0"/>
+              <a:t>‘else’ must finish with a colon</a:t>
+            </a:r>
+          </a:p>
+        </p:txBody>
+      </p:sp>
+      <p:cxnSp>
+        <p:nvCxnSpPr>
+          <p:cNvPr id="37" name="Straight Arrow Connector 36">
+            <a:extLst>
+              <a:ext uri="{FF2B5EF4-FFF2-40B4-BE49-F238E27FC236}">
+                <a16:creationId xmlns:a16="http://schemas.microsoft.com/office/drawing/2014/main" id="{286699FA-1289-5F51-7792-B740CEB6EE62}"/>
+              </a:ext>
+            </a:extLst>
+          </p:cNvPr>
+          <p:cNvCxnSpPr>
+            <a:stCxn id="34" idx="1"/>
+          </p:cNvCxnSpPr>
+          <p:nvPr/>
+        </p:nvCxnSpPr>
+        <p:spPr>
+          <a:xfrm flipH="1" flipV="1">
+            <a:off x="3878457" y="4256211"/>
+            <a:ext cx="2217543" cy="251566"/>
+          </a:xfrm>
+          <a:prstGeom prst="straightConnector1">
+            <a:avLst/>
+          </a:prstGeom>
+          <a:ln>
+            <a:tailEnd type="triangle"/>
+          </a:ln>
+        </p:spPr>
+        <p:style>
+          <a:lnRef idx="2">
+            <a:schemeClr val="accent1"/>
+          </a:lnRef>
+          <a:fillRef idx="0">
+            <a:schemeClr val="accent1"/>
+          </a:fillRef>
+          <a:effectRef idx="1">
+            <a:schemeClr val="accent1"/>
+          </a:effectRef>
+          <a:fontRef idx="minor">
+            <a:schemeClr val="tx1"/>
+          </a:fontRef>
+        </p:style>
+      </p:cxnSp>
+      <p:sp>
+        <p:nvSpPr>
+          <p:cNvPr id="38" name="TextBox 37">
+            <a:extLst>
+              <a:ext uri="{FF2B5EF4-FFF2-40B4-BE49-F238E27FC236}">
+                <a16:creationId xmlns:a16="http://schemas.microsoft.com/office/drawing/2014/main" id="{957E2FCD-2F89-39AB-8F46-5D43CB0C978E}"/>
+              </a:ext>
+            </a:extLst>
+          </p:cNvPr>
+          <p:cNvSpPr txBox="1"/>
+          <p:nvPr/>
+        </p:nvSpPr>
+        <p:spPr>
+          <a:xfrm>
+            <a:off x="6096000" y="3310995"/>
+            <a:ext cx="1581912" cy="553998"/>
+          </a:xfrm>
+          <a:prstGeom prst="rect">
+            <a:avLst/>
+          </a:prstGeom>
+          <a:solidFill>
+            <a:schemeClr val="bg1">
+              <a:alpha val="84000"/>
+            </a:schemeClr>
+          </a:solidFill>
+          <a:ln w="19050">
+            <a:solidFill>
+              <a:schemeClr val="accent1"/>
+            </a:solidFill>
+          </a:ln>
+        </p:spPr>
+        <p:txBody>
+          <a:bodyPr wrap="square" rtlCol="0">
+            <a:spAutoFit/>
+          </a:bodyPr>
+          <a:lstStyle/>
+          <a:p>
+            <a:r>
+              <a:rPr lang="en-AU" sz="1000" dirty="0"/>
+              <a:t>These blank lines are optional. They make the code more readable</a:t>
+            </a:r>
+          </a:p>
+        </p:txBody>
+      </p:sp>
+      <p:cxnSp>
+        <p:nvCxnSpPr>
+          <p:cNvPr id="40" name="Straight Arrow Connector 39">
+            <a:extLst>
+              <a:ext uri="{FF2B5EF4-FFF2-40B4-BE49-F238E27FC236}">
+                <a16:creationId xmlns:a16="http://schemas.microsoft.com/office/drawing/2014/main" id="{E9CDFD23-BA86-211E-87B2-01E36C241C2C}"/>
+              </a:ext>
+            </a:extLst>
+          </p:cNvPr>
+          <p:cNvCxnSpPr>
+            <a:cxnSpLocks/>
+            <a:stCxn id="38" idx="1"/>
+          </p:cNvCxnSpPr>
+          <p:nvPr/>
+        </p:nvCxnSpPr>
+        <p:spPr>
+          <a:xfrm flipH="1" flipV="1">
+            <a:off x="4718304" y="3505742"/>
+            <a:ext cx="1377696" cy="82252"/>
+          </a:xfrm>
+          <a:prstGeom prst="straightConnector1">
+            <a:avLst/>
+          </a:prstGeom>
+          <a:ln>
+            <a:tailEnd type="triangle"/>
+          </a:ln>
+        </p:spPr>
+        <p:style>
+          <a:lnRef idx="2">
+            <a:schemeClr val="accent1"/>
+          </a:lnRef>
+          <a:fillRef idx="0">
+            <a:schemeClr val="accent1"/>
+          </a:fillRef>
+          <a:effectRef idx="1">
+            <a:schemeClr val="accent1"/>
+          </a:effectRef>
+          <a:fontRef idx="minor">
+            <a:schemeClr val="tx1"/>
+          </a:fontRef>
+        </p:style>
+      </p:cxnSp>
+      <p:cxnSp>
+        <p:nvCxnSpPr>
+          <p:cNvPr id="43" name="Straight Arrow Connector 42">
+            <a:extLst>
+              <a:ext uri="{FF2B5EF4-FFF2-40B4-BE49-F238E27FC236}">
+                <a16:creationId xmlns:a16="http://schemas.microsoft.com/office/drawing/2014/main" id="{8B4F32F2-E981-D717-0A96-BC5C925A33AC}"/>
+              </a:ext>
+            </a:extLst>
+          </p:cNvPr>
+          <p:cNvCxnSpPr>
+            <a:stCxn id="38" idx="1"/>
+          </p:cNvCxnSpPr>
+          <p:nvPr/>
+        </p:nvCxnSpPr>
+        <p:spPr>
+          <a:xfrm flipH="1" flipV="1">
+            <a:off x="4489704" y="2907829"/>
+            <a:ext cx="1606296" cy="680165"/>
+          </a:xfrm>
+          <a:prstGeom prst="straightConnector1">
+            <a:avLst/>
+          </a:prstGeom>
+          <a:ln>
+            <a:tailEnd type="triangle"/>
+          </a:ln>
+        </p:spPr>
+        <p:style>
+          <a:lnRef idx="2">
+            <a:schemeClr val="accent1"/>
+          </a:lnRef>
+          <a:fillRef idx="0">
+            <a:schemeClr val="accent1"/>
+          </a:fillRef>
+          <a:effectRef idx="1">
+            <a:schemeClr val="accent1"/>
+          </a:effectRef>
+          <a:fontRef idx="minor">
+            <a:schemeClr val="tx1"/>
+          </a:fontRef>
+        </p:style>
+      </p:cxnSp>
     </p:spTree>
     <p:extLst>
       <p:ext uri="{BB962C8B-B14F-4D97-AF65-F5344CB8AC3E}">
         <p14:creationId xmlns:p14="http://schemas.microsoft.com/office/powerpoint/2010/main" val="4106103696"/>
+      </p:ext>
+    </p:extLst>
+  </p:cSld>
+  <p:clrMapOvr>
+    <a:masterClrMapping/>
+  </p:clrMapOvr>
+</p:sld>
+</file>
+
+<file path=ppt/slides/slide3.xml><?xml version="1.0" encoding="utf-8"?>
+<p:sld xmlns:a="http://schemas.openxmlformats.org/drawingml/2006/main" xmlns:r="http://schemas.openxmlformats.org/officeDocument/2006/relationships" xmlns:p="http://schemas.openxmlformats.org/presentationml/2006/main">
+  <p:cSld>
+    <p:spTree>
+      <p:nvGrpSpPr>
+        <p:cNvPr id="1" name=""/>
+        <p:cNvGrpSpPr/>
+        <p:nvPr/>
+      </p:nvGrpSpPr>
+      <p:grpSpPr>
+        <a:xfrm>
+          <a:off x="0" y="0"/>
+          <a:ext cx="0" cy="0"/>
+          <a:chOff x="0" y="0"/>
+          <a:chExt cx="0" cy="0"/>
+        </a:xfrm>
+      </p:grpSpPr>
+      <p:pic>
+        <p:nvPicPr>
+          <p:cNvPr id="5" name="Picture 4">
+            <a:extLst>
+              <a:ext uri="{FF2B5EF4-FFF2-40B4-BE49-F238E27FC236}">
+                <a16:creationId xmlns:a16="http://schemas.microsoft.com/office/drawing/2014/main" id="{0EDBEC30-61BE-6947-5D42-B2A4EB63839F}"/>
+              </a:ext>
+            </a:extLst>
+          </p:cNvPr>
+          <p:cNvPicPr>
+            <a:picLocks noChangeAspect="1"/>
+          </p:cNvPicPr>
+          <p:nvPr/>
+        </p:nvPicPr>
+        <p:blipFill>
+          <a:blip r:embed="rId2"/>
+          <a:stretch>
+            <a:fillRect/>
+          </a:stretch>
+        </p:blipFill>
+        <p:spPr>
+          <a:xfrm>
+            <a:off x="2879417" y="997346"/>
+            <a:ext cx="6918817" cy="4073417"/>
+          </a:xfrm>
+          <a:prstGeom prst="rect">
+            <a:avLst/>
+          </a:prstGeom>
+        </p:spPr>
+      </p:pic>
+      <p:sp>
+        <p:nvSpPr>
+          <p:cNvPr id="6" name="TextBox 5">
+            <a:extLst>
+              <a:ext uri="{FF2B5EF4-FFF2-40B4-BE49-F238E27FC236}">
+                <a16:creationId xmlns:a16="http://schemas.microsoft.com/office/drawing/2014/main" id="{219B6109-718C-C100-8C74-16CD0FD561F1}"/>
+              </a:ext>
+            </a:extLst>
+          </p:cNvPr>
+          <p:cNvSpPr txBox="1"/>
+          <p:nvPr/>
+        </p:nvSpPr>
+        <p:spPr>
+          <a:xfrm>
+            <a:off x="270368" y="3156992"/>
+            <a:ext cx="1161288" cy="400110"/>
+          </a:xfrm>
+          <a:prstGeom prst="rect">
+            <a:avLst/>
+          </a:prstGeom>
+          <a:noFill/>
+          <a:ln w="19050">
+            <a:solidFill>
+              <a:schemeClr val="accent1"/>
+            </a:solidFill>
+          </a:ln>
+        </p:spPr>
+        <p:txBody>
+          <a:bodyPr wrap="square" rtlCol="0">
+            <a:spAutoFit/>
+          </a:bodyPr>
+          <a:lstStyle/>
+          <a:p>
+            <a:r>
+              <a:rPr lang="en-AU" sz="1000" dirty="0"/>
+              <a:t>There must be two spaces here</a:t>
+            </a:r>
+          </a:p>
+        </p:txBody>
+      </p:sp>
+      <p:cxnSp>
+        <p:nvCxnSpPr>
+          <p:cNvPr id="7" name="Straight Arrow Connector 6">
+            <a:extLst>
+              <a:ext uri="{FF2B5EF4-FFF2-40B4-BE49-F238E27FC236}">
+                <a16:creationId xmlns:a16="http://schemas.microsoft.com/office/drawing/2014/main" id="{18F1A006-E843-5573-5741-1F4092576246}"/>
+              </a:ext>
+            </a:extLst>
+          </p:cNvPr>
+          <p:cNvCxnSpPr>
+            <a:cxnSpLocks/>
+          </p:cNvCxnSpPr>
+          <p:nvPr/>
+        </p:nvCxnSpPr>
+        <p:spPr>
+          <a:xfrm flipV="1">
+            <a:off x="1345151" y="2623127"/>
+            <a:ext cx="2364489" cy="733920"/>
+          </a:xfrm>
+          <a:prstGeom prst="straightConnector1">
+            <a:avLst/>
+          </a:prstGeom>
+          <a:ln>
+            <a:tailEnd type="triangle"/>
+          </a:ln>
+        </p:spPr>
+        <p:style>
+          <a:lnRef idx="2">
+            <a:schemeClr val="accent1"/>
+          </a:lnRef>
+          <a:fillRef idx="0">
+            <a:schemeClr val="accent1"/>
+          </a:fillRef>
+          <a:effectRef idx="1">
+            <a:schemeClr val="accent1"/>
+          </a:effectRef>
+          <a:fontRef idx="minor">
+            <a:schemeClr val="tx1"/>
+          </a:fontRef>
+        </p:style>
+      </p:cxnSp>
+      <p:sp>
+        <p:nvSpPr>
+          <p:cNvPr id="9" name="TextBox 8">
+            <a:extLst>
+              <a:ext uri="{FF2B5EF4-FFF2-40B4-BE49-F238E27FC236}">
+                <a16:creationId xmlns:a16="http://schemas.microsoft.com/office/drawing/2014/main" id="{9A1A2670-422B-51C4-608F-1C0D70EC93F7}"/>
+              </a:ext>
+            </a:extLst>
+          </p:cNvPr>
+          <p:cNvSpPr txBox="1"/>
+          <p:nvPr/>
+        </p:nvSpPr>
+        <p:spPr>
+          <a:xfrm>
+            <a:off x="5580013" y="858896"/>
+            <a:ext cx="1161288" cy="400110"/>
+          </a:xfrm>
+          <a:prstGeom prst="rect">
+            <a:avLst/>
+          </a:prstGeom>
+          <a:solidFill>
+            <a:schemeClr val="bg1"/>
+          </a:solidFill>
+          <a:ln w="19050">
+            <a:solidFill>
+              <a:schemeClr val="accent1"/>
+            </a:solidFill>
+          </a:ln>
+        </p:spPr>
+        <p:txBody>
+          <a:bodyPr wrap="square" rtlCol="0">
+            <a:spAutoFit/>
+          </a:bodyPr>
+          <a:lstStyle/>
+          <a:p>
+            <a:r>
+              <a:rPr lang="en-AU" sz="1000" dirty="0"/>
+              <a:t>There must be one space here</a:t>
+            </a:r>
+          </a:p>
+        </p:txBody>
+      </p:sp>
+      <p:cxnSp>
+        <p:nvCxnSpPr>
+          <p:cNvPr id="16" name="Straight Arrow Connector 15">
+            <a:extLst>
+              <a:ext uri="{FF2B5EF4-FFF2-40B4-BE49-F238E27FC236}">
+                <a16:creationId xmlns:a16="http://schemas.microsoft.com/office/drawing/2014/main" id="{68A99005-6964-32C0-0431-539D486F8FE2}"/>
+              </a:ext>
+            </a:extLst>
+          </p:cNvPr>
+          <p:cNvCxnSpPr>
+            <a:cxnSpLocks/>
+            <a:stCxn id="9" idx="2"/>
+          </p:cNvCxnSpPr>
+          <p:nvPr/>
+        </p:nvCxnSpPr>
+        <p:spPr>
+          <a:xfrm flipH="1">
+            <a:off x="5312158" y="1259006"/>
+            <a:ext cx="848499" cy="1263409"/>
+          </a:xfrm>
+          <a:prstGeom prst="straightConnector1">
+            <a:avLst/>
+          </a:prstGeom>
+          <a:ln>
+            <a:tailEnd type="triangle"/>
+          </a:ln>
+        </p:spPr>
+        <p:style>
+          <a:lnRef idx="2">
+            <a:schemeClr val="accent1"/>
+          </a:lnRef>
+          <a:fillRef idx="0">
+            <a:schemeClr val="accent1"/>
+          </a:fillRef>
+          <a:effectRef idx="1">
+            <a:schemeClr val="accent1"/>
+          </a:effectRef>
+          <a:fontRef idx="minor">
+            <a:schemeClr val="tx1"/>
+          </a:fontRef>
+        </p:style>
+      </p:cxnSp>
+      <p:cxnSp>
+        <p:nvCxnSpPr>
+          <p:cNvPr id="21" name="Straight Arrow Connector 20">
+            <a:extLst>
+              <a:ext uri="{FF2B5EF4-FFF2-40B4-BE49-F238E27FC236}">
+                <a16:creationId xmlns:a16="http://schemas.microsoft.com/office/drawing/2014/main" id="{39A38E87-1C7C-8EEA-C419-FB1527CA0A76}"/>
+              </a:ext>
+            </a:extLst>
+          </p:cNvPr>
+          <p:cNvCxnSpPr>
+            <a:cxnSpLocks/>
+            <a:stCxn id="9" idx="2"/>
+          </p:cNvCxnSpPr>
+          <p:nvPr/>
+        </p:nvCxnSpPr>
+        <p:spPr>
+          <a:xfrm flipH="1">
+            <a:off x="4137891" y="1259006"/>
+            <a:ext cx="2022766" cy="1308950"/>
+          </a:xfrm>
+          <a:prstGeom prst="straightConnector1">
+            <a:avLst/>
+          </a:prstGeom>
+          <a:ln>
+            <a:tailEnd type="triangle"/>
+          </a:ln>
+        </p:spPr>
+        <p:style>
+          <a:lnRef idx="2">
+            <a:schemeClr val="accent1"/>
+          </a:lnRef>
+          <a:fillRef idx="0">
+            <a:schemeClr val="accent1"/>
+          </a:fillRef>
+          <a:effectRef idx="1">
+            <a:schemeClr val="accent1"/>
+          </a:effectRef>
+          <a:fontRef idx="minor">
+            <a:schemeClr val="tx1"/>
+          </a:fontRef>
+        </p:style>
+      </p:cxnSp>
+      <p:sp>
+        <p:nvSpPr>
+          <p:cNvPr id="27" name="TextBox 26">
+            <a:extLst>
+              <a:ext uri="{FF2B5EF4-FFF2-40B4-BE49-F238E27FC236}">
+                <a16:creationId xmlns:a16="http://schemas.microsoft.com/office/drawing/2014/main" id="{F96399AC-A236-AA3F-F72D-6E5616D084F6}"/>
+              </a:ext>
+            </a:extLst>
+          </p:cNvPr>
+          <p:cNvSpPr txBox="1"/>
+          <p:nvPr/>
+        </p:nvSpPr>
+        <p:spPr>
+          <a:xfrm>
+            <a:off x="940005" y="3730191"/>
+            <a:ext cx="1638489" cy="553998"/>
+          </a:xfrm>
+          <a:prstGeom prst="rect">
+            <a:avLst/>
+          </a:prstGeom>
+          <a:noFill/>
+          <a:ln w="19050">
+            <a:solidFill>
+              <a:schemeClr val="accent1"/>
+            </a:solidFill>
+          </a:ln>
+        </p:spPr>
+        <p:txBody>
+          <a:bodyPr wrap="square" rtlCol="0">
+            <a:spAutoFit/>
+          </a:bodyPr>
+          <a:lstStyle/>
+          <a:p>
+            <a:r>
+              <a:rPr lang="en-AU" sz="1000" dirty="0"/>
+              <a:t>These must be aligned with the field label (‘no label’ in this case)</a:t>
+            </a:r>
+          </a:p>
+        </p:txBody>
+      </p:sp>
+      <p:sp>
+        <p:nvSpPr>
+          <p:cNvPr id="28" name="Left Brace 27">
+            <a:extLst>
+              <a:ext uri="{FF2B5EF4-FFF2-40B4-BE49-F238E27FC236}">
+                <a16:creationId xmlns:a16="http://schemas.microsoft.com/office/drawing/2014/main" id="{84F4513B-C86E-0583-AF51-BF0C488A8527}"/>
+              </a:ext>
+            </a:extLst>
+          </p:cNvPr>
+          <p:cNvSpPr/>
+          <p:nvPr/>
+        </p:nvSpPr>
+        <p:spPr>
+          <a:xfrm>
+            <a:off x="3796145" y="2770909"/>
+            <a:ext cx="267855" cy="586138"/>
+          </a:xfrm>
+          <a:prstGeom prst="leftBrace">
+            <a:avLst/>
+          </a:prstGeom>
+        </p:spPr>
+        <p:style>
+          <a:lnRef idx="2">
+            <a:schemeClr val="accent1"/>
+          </a:lnRef>
+          <a:fillRef idx="0">
+            <a:schemeClr val="accent1"/>
+          </a:fillRef>
+          <a:effectRef idx="1">
+            <a:schemeClr val="accent1"/>
+          </a:effectRef>
+          <a:fontRef idx="minor">
+            <a:schemeClr val="tx1"/>
+          </a:fontRef>
+        </p:style>
+        <p:txBody>
+          <a:bodyPr rtlCol="0" anchor="ctr"/>
+          <a:lstStyle/>
+          <a:p>
+            <a:pPr algn="ctr"/>
+            <a:endParaRPr lang="en-AU"/>
+          </a:p>
+        </p:txBody>
+      </p:sp>
+      <p:cxnSp>
+        <p:nvCxnSpPr>
+          <p:cNvPr id="30" name="Straight Arrow Connector 29">
+            <a:extLst>
+              <a:ext uri="{FF2B5EF4-FFF2-40B4-BE49-F238E27FC236}">
+                <a16:creationId xmlns:a16="http://schemas.microsoft.com/office/drawing/2014/main" id="{4143A4A5-9C10-FB80-08DE-1B6B31B35928}"/>
+              </a:ext>
+            </a:extLst>
+          </p:cNvPr>
+          <p:cNvCxnSpPr>
+            <a:stCxn id="27" idx="3"/>
+            <a:endCxn id="28" idx="1"/>
+          </p:cNvCxnSpPr>
+          <p:nvPr/>
+        </p:nvCxnSpPr>
+        <p:spPr>
+          <a:xfrm flipV="1">
+            <a:off x="2578494" y="3063978"/>
+            <a:ext cx="1217651" cy="943212"/>
+          </a:xfrm>
+          <a:prstGeom prst="straightConnector1">
+            <a:avLst/>
+          </a:prstGeom>
+          <a:ln>
+            <a:tailEnd type="triangle"/>
+          </a:ln>
+        </p:spPr>
+        <p:style>
+          <a:lnRef idx="2">
+            <a:schemeClr val="accent1"/>
+          </a:lnRef>
+          <a:fillRef idx="0">
+            <a:schemeClr val="accent1"/>
+          </a:fillRef>
+          <a:effectRef idx="1">
+            <a:schemeClr val="accent1"/>
+          </a:effectRef>
+          <a:fontRef idx="minor">
+            <a:schemeClr val="tx1"/>
+          </a:fontRef>
+        </p:style>
+      </p:cxnSp>
+      <p:sp>
+        <p:nvSpPr>
+          <p:cNvPr id="31" name="TextBox 30">
+            <a:extLst>
+              <a:ext uri="{FF2B5EF4-FFF2-40B4-BE49-F238E27FC236}">
+                <a16:creationId xmlns:a16="http://schemas.microsoft.com/office/drawing/2014/main" id="{E718DC85-F6DD-A6DE-5A96-D2E57677CF1C}"/>
+              </a:ext>
+            </a:extLst>
+          </p:cNvPr>
+          <p:cNvSpPr txBox="1"/>
+          <p:nvPr/>
+        </p:nvSpPr>
+        <p:spPr>
+          <a:xfrm>
+            <a:off x="975411" y="4541055"/>
+            <a:ext cx="1638489" cy="553998"/>
+          </a:xfrm>
+          <a:prstGeom prst="rect">
+            <a:avLst/>
+          </a:prstGeom>
+          <a:noFill/>
+          <a:ln w="19050">
+            <a:solidFill>
+              <a:schemeClr val="accent1"/>
+            </a:solidFill>
+          </a:ln>
+        </p:spPr>
+        <p:txBody>
+          <a:bodyPr wrap="square" rtlCol="0">
+            <a:spAutoFit/>
+          </a:bodyPr>
+          <a:lstStyle/>
+          <a:p>
+            <a:r>
+              <a:rPr lang="en-AU" sz="1000" dirty="0"/>
+              <a:t>The dashes must be aligned two spaces in from ‘choices’</a:t>
+            </a:r>
+          </a:p>
+        </p:txBody>
+      </p:sp>
+      <p:sp>
+        <p:nvSpPr>
+          <p:cNvPr id="32" name="Left Brace 31">
+            <a:extLst>
+              <a:ext uri="{FF2B5EF4-FFF2-40B4-BE49-F238E27FC236}">
+                <a16:creationId xmlns:a16="http://schemas.microsoft.com/office/drawing/2014/main" id="{5EE61E42-9D74-8B4E-0D42-619411C43155}"/>
+              </a:ext>
+            </a:extLst>
+          </p:cNvPr>
+          <p:cNvSpPr/>
+          <p:nvPr/>
+        </p:nvSpPr>
+        <p:spPr>
+          <a:xfrm>
+            <a:off x="3963723" y="3491021"/>
+            <a:ext cx="288666" cy="1247234"/>
+          </a:xfrm>
+          <a:prstGeom prst="leftBrace">
+            <a:avLst/>
+          </a:prstGeom>
+        </p:spPr>
+        <p:style>
+          <a:lnRef idx="2">
+            <a:schemeClr val="accent1"/>
+          </a:lnRef>
+          <a:fillRef idx="0">
+            <a:schemeClr val="accent1"/>
+          </a:fillRef>
+          <a:effectRef idx="1">
+            <a:schemeClr val="accent1"/>
+          </a:effectRef>
+          <a:fontRef idx="minor">
+            <a:schemeClr val="tx1"/>
+          </a:fontRef>
+        </p:style>
+        <p:txBody>
+          <a:bodyPr rtlCol="0" anchor="ctr"/>
+          <a:lstStyle/>
+          <a:p>
+            <a:pPr algn="ctr"/>
+            <a:endParaRPr lang="en-AU"/>
+          </a:p>
+        </p:txBody>
+      </p:sp>
+      <p:cxnSp>
+        <p:nvCxnSpPr>
+          <p:cNvPr id="34" name="Straight Arrow Connector 33">
+            <a:extLst>
+              <a:ext uri="{FF2B5EF4-FFF2-40B4-BE49-F238E27FC236}">
+                <a16:creationId xmlns:a16="http://schemas.microsoft.com/office/drawing/2014/main" id="{4DB772D3-1B69-8726-DD6C-14FFB77A127C}"/>
+              </a:ext>
+            </a:extLst>
+          </p:cNvPr>
+          <p:cNvCxnSpPr>
+            <a:stCxn id="31" idx="3"/>
+            <a:endCxn id="32" idx="1"/>
+          </p:cNvCxnSpPr>
+          <p:nvPr/>
+        </p:nvCxnSpPr>
+        <p:spPr>
+          <a:xfrm flipV="1">
+            <a:off x="2613900" y="4114638"/>
+            <a:ext cx="1349823" cy="703416"/>
+          </a:xfrm>
+          <a:prstGeom prst="straightConnector1">
+            <a:avLst/>
+          </a:prstGeom>
+          <a:ln>
+            <a:tailEnd type="triangle"/>
+          </a:ln>
+        </p:spPr>
+        <p:style>
+          <a:lnRef idx="2">
+            <a:schemeClr val="accent1"/>
+          </a:lnRef>
+          <a:fillRef idx="0">
+            <a:schemeClr val="accent1"/>
+          </a:fillRef>
+          <a:effectRef idx="1">
+            <a:schemeClr val="accent1"/>
+          </a:effectRef>
+          <a:fontRef idx="minor">
+            <a:schemeClr val="tx1"/>
+          </a:fontRef>
+        </p:style>
+      </p:cxnSp>
+      <p:sp>
+        <p:nvSpPr>
+          <p:cNvPr id="35" name="TextBox 34">
+            <a:extLst>
+              <a:ext uri="{FF2B5EF4-FFF2-40B4-BE49-F238E27FC236}">
+                <a16:creationId xmlns:a16="http://schemas.microsoft.com/office/drawing/2014/main" id="{9EF2BDB3-F779-1CC0-3C67-DED1B77BFD17}"/>
+              </a:ext>
+            </a:extLst>
+          </p:cNvPr>
+          <p:cNvSpPr txBox="1"/>
+          <p:nvPr/>
+        </p:nvSpPr>
+        <p:spPr>
+          <a:xfrm>
+            <a:off x="4043422" y="5472142"/>
+            <a:ext cx="1399310" cy="553998"/>
+          </a:xfrm>
+          <a:prstGeom prst="rect">
+            <a:avLst/>
+          </a:prstGeom>
+          <a:solidFill>
+            <a:schemeClr val="bg1"/>
+          </a:solidFill>
+          <a:ln w="19050">
+            <a:solidFill>
+              <a:schemeClr val="accent1"/>
+            </a:solidFill>
+          </a:ln>
+        </p:spPr>
+        <p:txBody>
+          <a:bodyPr wrap="square" rtlCol="0">
+            <a:spAutoFit/>
+          </a:bodyPr>
+          <a:lstStyle/>
+          <a:p>
+            <a:r>
+              <a:rPr lang="en-AU" sz="1000" dirty="0"/>
+              <a:t>There must be one space between the dash and the data</a:t>
+            </a:r>
+          </a:p>
+        </p:txBody>
+      </p:sp>
+      <p:cxnSp>
+        <p:nvCxnSpPr>
+          <p:cNvPr id="37" name="Straight Arrow Connector 36">
+            <a:extLst>
+              <a:ext uri="{FF2B5EF4-FFF2-40B4-BE49-F238E27FC236}">
+                <a16:creationId xmlns:a16="http://schemas.microsoft.com/office/drawing/2014/main" id="{8A884EEC-2313-EEF2-6150-654DA465134C}"/>
+              </a:ext>
+            </a:extLst>
+          </p:cNvPr>
+          <p:cNvCxnSpPr>
+            <a:cxnSpLocks/>
+            <a:stCxn id="35" idx="0"/>
+          </p:cNvCxnSpPr>
+          <p:nvPr/>
+        </p:nvCxnSpPr>
+        <p:spPr>
+          <a:xfrm flipH="1" flipV="1">
+            <a:off x="4599709" y="4738255"/>
+            <a:ext cx="143368" cy="733887"/>
+          </a:xfrm>
+          <a:prstGeom prst="straightConnector1">
+            <a:avLst/>
+          </a:prstGeom>
+          <a:ln>
+            <a:tailEnd type="triangle"/>
+          </a:ln>
+        </p:spPr>
+        <p:style>
+          <a:lnRef idx="2">
+            <a:schemeClr val="accent1"/>
+          </a:lnRef>
+          <a:fillRef idx="0">
+            <a:schemeClr val="accent1"/>
+          </a:fillRef>
+          <a:effectRef idx="1">
+            <a:schemeClr val="accent1"/>
+          </a:effectRef>
+          <a:fontRef idx="minor">
+            <a:schemeClr val="tx1"/>
+          </a:fontRef>
+        </p:style>
+      </p:cxnSp>
+      <p:sp>
+        <p:nvSpPr>
+          <p:cNvPr id="39" name="TextBox 38">
+            <a:extLst>
+              <a:ext uri="{FF2B5EF4-FFF2-40B4-BE49-F238E27FC236}">
+                <a16:creationId xmlns:a16="http://schemas.microsoft.com/office/drawing/2014/main" id="{A432D06E-16DB-445D-334C-09DB8F0AA132}"/>
+              </a:ext>
+            </a:extLst>
+          </p:cNvPr>
+          <p:cNvSpPr txBox="1"/>
+          <p:nvPr/>
+        </p:nvSpPr>
+        <p:spPr>
+          <a:xfrm>
+            <a:off x="5551744" y="3273700"/>
+            <a:ext cx="1399310" cy="1015663"/>
+          </a:xfrm>
+          <a:prstGeom prst="rect">
+            <a:avLst/>
+          </a:prstGeom>
+          <a:solidFill>
+            <a:schemeClr val="bg1"/>
+          </a:solidFill>
+          <a:ln w="19050">
+            <a:solidFill>
+              <a:schemeClr val="accent1"/>
+            </a:solidFill>
+          </a:ln>
+        </p:spPr>
+        <p:txBody>
+          <a:bodyPr wrap="square" rtlCol="0">
+            <a:spAutoFit/>
+          </a:bodyPr>
+          <a:lstStyle/>
+          <a:p>
+            <a:r>
+              <a:rPr lang="en-AU" sz="1000" dirty="0"/>
+              <a:t>This is the ‘field label’ It appears on your program’s screen. In this case we’ve specified for no label at all to be displayed.</a:t>
+            </a:r>
+          </a:p>
+        </p:txBody>
+      </p:sp>
+      <p:cxnSp>
+        <p:nvCxnSpPr>
+          <p:cNvPr id="45" name="Straight Arrow Connector 44">
+            <a:extLst>
+              <a:ext uri="{FF2B5EF4-FFF2-40B4-BE49-F238E27FC236}">
+                <a16:creationId xmlns:a16="http://schemas.microsoft.com/office/drawing/2014/main" id="{825FE6BD-128C-E447-C529-DBAF47B66D2E}"/>
+              </a:ext>
+            </a:extLst>
+          </p:cNvPr>
+          <p:cNvCxnSpPr>
+            <a:cxnSpLocks/>
+            <a:stCxn id="39" idx="1"/>
+          </p:cNvCxnSpPr>
+          <p:nvPr/>
+        </p:nvCxnSpPr>
+        <p:spPr>
+          <a:xfrm flipH="1" flipV="1">
+            <a:off x="4854919" y="2749868"/>
+            <a:ext cx="696825" cy="1031664"/>
+          </a:xfrm>
+          <a:prstGeom prst="straightConnector1">
+            <a:avLst/>
+          </a:prstGeom>
+          <a:ln>
+            <a:tailEnd type="triangle"/>
+          </a:ln>
+        </p:spPr>
+        <p:style>
+          <a:lnRef idx="2">
+            <a:schemeClr val="accent1"/>
+          </a:lnRef>
+          <a:fillRef idx="0">
+            <a:schemeClr val="accent1"/>
+          </a:fillRef>
+          <a:effectRef idx="1">
+            <a:schemeClr val="accent1"/>
+          </a:effectRef>
+          <a:fontRef idx="minor">
+            <a:schemeClr val="tx1"/>
+          </a:fontRef>
+        </p:style>
+      </p:cxnSp>
+    </p:spTree>
+    <p:extLst>
+      <p:ext uri="{BB962C8B-B14F-4D97-AF65-F5344CB8AC3E}">
+        <p14:creationId xmlns:p14="http://schemas.microsoft.com/office/powerpoint/2010/main" val="2240069267"/>
       </p:ext>
     </p:extLst>
   </p:cSld>

</xml_diff>